<commit_message>
README.md modified with link to sw libraries and link to the repo
</commit_message>
<xml_diff>
--- a/relazione/Canduci_Marino_Mollica.pptx
+++ b/relazione/Canduci_Marino_Mollica.pptx
@@ -18532,7 +18532,7 @@
               <a:t> 3 </a:t>
             </a:r>
             <a:r>
-              <a:rPr lang="it-IT" sz="1400" dirty="0" err="1">
+              <a:rPr lang="it-IT" sz="1400" dirty="0">
                 <a:hlinkClick r:id="rId4"/>
               </a:rPr>
               <a:t>documentation</a:t>
@@ -18569,7 +18569,7 @@
                 </a:solidFill>
                 <a:latin typeface="Arial"/>
               </a:rPr>
-              <a:t> et al., 2015, </a:t>
+              <a:t> et al., </a:t>
             </a:r>
             <a:r>
               <a:rPr lang="it-IT" sz="1400" i="1" spc="-1" dirty="0" err="1">
@@ -18630,7 +18630,20 @@
                 <a:effectLst/>
                 <a:latin typeface="Arial Unicode MS"/>
               </a:rPr>
-              <a:t> systems</a:t>
+              <a:t> systems </a:t>
+            </a:r>
+            <a:r>
+              <a:rPr kumimoji="0" lang="it-IT" altLang="it-IT" sz="1400" b="0" u="none" strike="noStrike" cap="none" normalizeH="0" baseline="0" dirty="0">
+                <a:ln>
+                  <a:noFill/>
+                </a:ln>
+                <a:solidFill>
+                  <a:schemeClr val="tx1"/>
+                </a:solidFill>
+                <a:effectLst/>
+                <a:latin typeface="Arial Unicode MS"/>
+              </a:rPr>
+              <a:t>(2015)</a:t>
             </a:r>
             <a:r>
               <a:rPr kumimoji="0" lang="it-IT" altLang="it-IT" sz="1400" b="0" i="0" u="none" strike="noStrike" cap="none" normalizeH="0" baseline="0" dirty="0">
@@ -18920,15 +18933,7 @@
             </a:r>
             <a:r>
               <a:rPr lang="it-IT" sz="1600" dirty="0"/>
-              <a:t> project, with </a:t>
-            </a:r>
-            <a:r>
-              <a:rPr lang="it-IT" sz="1600" dirty="0" err="1"/>
-              <a:t>documentation</a:t>
-            </a:r>
-            <a:r>
-              <a:rPr lang="it-IT" sz="1600" dirty="0"/>
-              <a:t>:</a:t>
+              <a:t> project, with documentation:</a:t>
             </a:r>
           </a:p>
         </p:txBody>

</xml_diff>